<commit_message>
added workflow draft: BEACH Analysis
I added some slides to help outline our BEACH analysis workflow using redcap. This includes the: get-format-build concept.
</commit_message>
<xml_diff>
--- a/documents/presentation/workflows.pptx
+++ b/documents/presentation/workflows.pptx
@@ -9,9 +9,12 @@
     <p:sldId id="270" r:id="rId3"/>
     <p:sldId id="273" r:id="rId4"/>
     <p:sldId id="274" r:id="rId5"/>
-    <p:sldId id="275" r:id="rId6"/>
-    <p:sldId id="271" r:id="rId7"/>
-    <p:sldId id="272" r:id="rId8"/>
+    <p:sldId id="276" r:id="rId6"/>
+    <p:sldId id="275" r:id="rId7"/>
+    <p:sldId id="277" r:id="rId8"/>
+    <p:sldId id="278" r:id="rId9"/>
+    <p:sldId id="271" r:id="rId10"/>
+    <p:sldId id="272" r:id="rId11"/>
   </p:sldIdLst>
   <p:sldSz cx="12192000" cy="6858000"/>
   <p:notesSz cx="6858000" cy="9144000"/>
@@ -147,7 +150,7 @@
 <file path=ppt/revisionInfo.xml><?xml version="1.0" encoding="utf-8"?>
 <p1510:revInfo xmlns:a="http://schemas.openxmlformats.org/drawingml/2006/main" xmlns:r="http://schemas.openxmlformats.org/officeDocument/2006/relationships" xmlns:p1510="http://schemas.microsoft.com/office/powerpoint/2015/10/main">
   <p1510:revLst>
-    <p1510:client id="{39387632-5FD3-4B46-8C42-CF88FC459C59}" v="2" dt="2022-10-18T18:29:42.412"/>
+    <p1510:client id="{39387632-5FD3-4B46-8C42-CF88FC459C59}" v="25" dt="2023-01-04T17:33:02.973"/>
   </p1510:revLst>
 </p1510:revInfo>
 </file>
@@ -157,7 +160,7 @@
   <pc:docChgLst>
     <pc:chgData name="Dominick Lemas" userId="5a87caf6b30614cd" providerId="LiveId" clId="{39387632-5FD3-4B46-8C42-CF88FC459C59}"/>
     <pc:docChg chg="custSel addSld delSld modSld sldOrd">
-      <pc:chgData name="Dominick Lemas" userId="5a87caf6b30614cd" providerId="LiveId" clId="{39387632-5FD3-4B46-8C42-CF88FC459C59}" dt="2022-10-18T18:29:59.858" v="182" actId="20577"/>
+      <pc:chgData name="Dominick Lemas" userId="5a87caf6b30614cd" providerId="LiveId" clId="{39387632-5FD3-4B46-8C42-CF88FC459C59}" dt="2023-01-04T17:33:19.181" v="624" actId="14100"/>
       <pc:docMkLst>
         <pc:docMk/>
       </pc:docMkLst>
@@ -280,7 +283,7 @@
         </pc:spChg>
       </pc:sldChg>
       <pc:sldChg chg="addSp delSp modSp new mod">
-        <pc:chgData name="Dominick Lemas" userId="5a87caf6b30614cd" providerId="LiveId" clId="{39387632-5FD3-4B46-8C42-CF88FC459C59}" dt="2022-10-18T18:29:36.101" v="141" actId="20577"/>
+        <pc:chgData name="Dominick Lemas" userId="5a87caf6b30614cd" providerId="LiveId" clId="{39387632-5FD3-4B46-8C42-CF88FC459C59}" dt="2023-01-04T17:23:11.234" v="276" actId="1582"/>
         <pc:sldMkLst>
           <pc:docMk/>
           <pc:sldMk cId="91610244" sldId="274"/>
@@ -302,28 +305,305 @@
           </ac:spMkLst>
         </pc:spChg>
         <pc:spChg chg="add mod">
-          <ac:chgData name="Dominick Lemas" userId="5a87caf6b30614cd" providerId="LiveId" clId="{39387632-5FD3-4B46-8C42-CF88FC459C59}" dt="2022-10-18T18:29:36.101" v="141" actId="20577"/>
+          <ac:chgData name="Dominick Lemas" userId="5a87caf6b30614cd" providerId="LiveId" clId="{39387632-5FD3-4B46-8C42-CF88FC459C59}" dt="2023-01-04T17:21:21.931" v="253" actId="20577"/>
+          <ac:spMkLst>
+            <pc:docMk/>
+            <pc:sldMk cId="91610244" sldId="274"/>
+            <ac:spMk id="3" creationId="{CB9D9483-62F4-23E9-7584-C9718015A7B8}"/>
+          </ac:spMkLst>
+        </pc:spChg>
+        <pc:spChg chg="add mod">
+          <ac:chgData name="Dominick Lemas" userId="5a87caf6b30614cd" providerId="LiveId" clId="{39387632-5FD3-4B46-8C42-CF88FC459C59}" dt="2023-01-04T17:20:37.634" v="231" actId="20577"/>
           <ac:spMkLst>
             <pc:docMk/>
             <pc:sldMk cId="91610244" sldId="274"/>
             <ac:spMk id="4" creationId="{1C0D414B-F80F-A899-4D38-B4D2CFD1EB5E}"/>
           </ac:spMkLst>
         </pc:spChg>
+        <pc:picChg chg="add mod">
+          <ac:chgData name="Dominick Lemas" userId="5a87caf6b30614cd" providerId="LiveId" clId="{39387632-5FD3-4B46-8C42-CF88FC459C59}" dt="2023-01-04T17:21:06.634" v="234" actId="1076"/>
+          <ac:picMkLst>
+            <pc:docMk/>
+            <pc:sldMk cId="91610244" sldId="274"/>
+            <ac:picMk id="2" creationId="{F38A6BF7-A292-2542-97FC-5A81FFD718BF}"/>
+          </ac:picMkLst>
+        </pc:picChg>
+        <pc:cxnChg chg="add mod">
+          <ac:chgData name="Dominick Lemas" userId="5a87caf6b30614cd" providerId="LiveId" clId="{39387632-5FD3-4B46-8C42-CF88FC459C59}" dt="2023-01-04T17:23:11.234" v="276" actId="1582"/>
+          <ac:cxnSpMkLst>
+            <pc:docMk/>
+            <pc:sldMk cId="91610244" sldId="274"/>
+            <ac:cxnSpMk id="6" creationId="{683C5E25-3F87-C815-1C9E-EFF6A1B6526D}"/>
+          </ac:cxnSpMkLst>
+        </pc:cxnChg>
       </pc:sldChg>
-      <pc:sldChg chg="modSp add mod">
-        <pc:chgData name="Dominick Lemas" userId="5a87caf6b30614cd" providerId="LiveId" clId="{39387632-5FD3-4B46-8C42-CF88FC459C59}" dt="2022-10-18T18:29:59.858" v="182" actId="20577"/>
+      <pc:sldChg chg="addSp delSp modSp add mod">
+        <pc:chgData name="Dominick Lemas" userId="5a87caf6b30614cd" providerId="LiveId" clId="{39387632-5FD3-4B46-8C42-CF88FC459C59}" dt="2023-01-04T17:32:05.515" v="590" actId="20577"/>
         <pc:sldMkLst>
           <pc:docMk/>
           <pc:sldMk cId="2440374943" sldId="275"/>
         </pc:sldMkLst>
-        <pc:spChg chg="mod">
-          <ac:chgData name="Dominick Lemas" userId="5a87caf6b30614cd" providerId="LiveId" clId="{39387632-5FD3-4B46-8C42-CF88FC459C59}" dt="2022-10-18T18:29:59.858" v="182" actId="20577"/>
+        <pc:spChg chg="add mod">
+          <ac:chgData name="Dominick Lemas" userId="5a87caf6b30614cd" providerId="LiveId" clId="{39387632-5FD3-4B46-8C42-CF88FC459C59}" dt="2023-01-04T17:22:13.026" v="273" actId="20577"/>
+          <ac:spMkLst>
+            <pc:docMk/>
+            <pc:sldMk cId="2440374943" sldId="275"/>
+            <ac:spMk id="2" creationId="{CB28B4E0-BD83-A256-76F1-CE0FA9FEDCA1}"/>
+          </ac:spMkLst>
+        </pc:spChg>
+        <pc:spChg chg="add mod">
+          <ac:chgData name="Dominick Lemas" userId="5a87caf6b30614cd" providerId="LiveId" clId="{39387632-5FD3-4B46-8C42-CF88FC459C59}" dt="2023-01-04T17:30:35.471" v="466" actId="1076"/>
+          <ac:spMkLst>
+            <pc:docMk/>
+            <pc:sldMk cId="2440374943" sldId="275"/>
+            <ac:spMk id="3" creationId="{EB0A1642-C7F2-ADEE-908B-7853CCE88B78}"/>
+          </ac:spMkLst>
+        </pc:spChg>
+        <pc:spChg chg="del mod">
+          <ac:chgData name="Dominick Lemas" userId="5a87caf6b30614cd" providerId="LiveId" clId="{39387632-5FD3-4B46-8C42-CF88FC459C59}" dt="2023-01-04T17:22:07.474" v="263" actId="478"/>
           <ac:spMkLst>
             <pc:docMk/>
             <pc:sldMk cId="2440374943" sldId="275"/>
             <ac:spMk id="4" creationId="{1C0D414B-F80F-A899-4D38-B4D2CFD1EB5E}"/>
           </ac:spMkLst>
         </pc:spChg>
+        <pc:spChg chg="add">
+          <ac:chgData name="Dominick Lemas" userId="5a87caf6b30614cd" providerId="LiveId" clId="{39387632-5FD3-4B46-8C42-CF88FC459C59}" dt="2023-01-04T17:31:11.108" v="475" actId="11529"/>
+          <ac:spMkLst>
+            <pc:docMk/>
+            <pc:sldMk cId="2440374943" sldId="275"/>
+            <ac:spMk id="11" creationId="{8D4C4FD1-7B4C-D3C7-D264-0B6FDF311ADF}"/>
+          </ac:spMkLst>
+        </pc:spChg>
+        <pc:spChg chg="add mod">
+          <ac:chgData name="Dominick Lemas" userId="5a87caf6b30614cd" providerId="LiveId" clId="{39387632-5FD3-4B46-8C42-CF88FC459C59}" dt="2023-01-04T17:31:15.128" v="477" actId="1076"/>
+          <ac:spMkLst>
+            <pc:docMk/>
+            <pc:sldMk cId="2440374943" sldId="275"/>
+            <ac:spMk id="12" creationId="{5E8EE4DA-782C-71C6-A187-9418DFFE781C}"/>
+          </ac:spMkLst>
+        </pc:spChg>
+        <pc:spChg chg="add mod">
+          <ac:chgData name="Dominick Lemas" userId="5a87caf6b30614cd" providerId="LiveId" clId="{39387632-5FD3-4B46-8C42-CF88FC459C59}" dt="2023-01-04T17:31:16.004" v="478"/>
+          <ac:spMkLst>
+            <pc:docMk/>
+            <pc:sldMk cId="2440374943" sldId="275"/>
+            <ac:spMk id="13" creationId="{1BAA4A62-B4C2-2634-17E9-DB4521B1EA6B}"/>
+          </ac:spMkLst>
+        </pc:spChg>
+        <pc:spChg chg="add mod">
+          <ac:chgData name="Dominick Lemas" userId="5a87caf6b30614cd" providerId="LiveId" clId="{39387632-5FD3-4B46-8C42-CF88FC459C59}" dt="2023-01-04T17:31:17.973" v="480" actId="1076"/>
+          <ac:spMkLst>
+            <pc:docMk/>
+            <pc:sldMk cId="2440374943" sldId="275"/>
+            <ac:spMk id="14" creationId="{68C90EF4-A3BB-4122-8D3F-5228FF982134}"/>
+          </ac:spMkLst>
+        </pc:spChg>
+        <pc:spChg chg="add mod">
+          <ac:chgData name="Dominick Lemas" userId="5a87caf6b30614cd" providerId="LiveId" clId="{39387632-5FD3-4B46-8C42-CF88FC459C59}" dt="2023-01-04T17:31:30.513" v="505" actId="1076"/>
+          <ac:spMkLst>
+            <pc:docMk/>
+            <pc:sldMk cId="2440374943" sldId="275"/>
+            <ac:spMk id="15" creationId="{5D7EA68C-0659-06FD-A1EE-285CCAFDB6C0}"/>
+          </ac:spMkLst>
+        </pc:spChg>
+        <pc:spChg chg="add mod">
+          <ac:chgData name="Dominick Lemas" userId="5a87caf6b30614cd" providerId="LiveId" clId="{39387632-5FD3-4B46-8C42-CF88FC459C59}" dt="2023-01-04T17:32:05.515" v="590" actId="20577"/>
+          <ac:spMkLst>
+            <pc:docMk/>
+            <pc:sldMk cId="2440374943" sldId="275"/>
+            <ac:spMk id="16" creationId="{112E39BF-FCB6-0786-1DC6-9214CE4C609D}"/>
+          </ac:spMkLst>
+        </pc:spChg>
+        <pc:cxnChg chg="add">
+          <ac:chgData name="Dominick Lemas" userId="5a87caf6b30614cd" providerId="LiveId" clId="{39387632-5FD3-4B46-8C42-CF88FC459C59}" dt="2023-01-04T17:30:48.812" v="467" actId="11529"/>
+          <ac:cxnSpMkLst>
+            <pc:docMk/>
+            <pc:sldMk cId="2440374943" sldId="275"/>
+            <ac:cxnSpMk id="6" creationId="{18E64C48-C163-7CB6-C4B3-63D7957FB494}"/>
+          </ac:cxnSpMkLst>
+        </pc:cxnChg>
+        <pc:cxnChg chg="add mod">
+          <ac:chgData name="Dominick Lemas" userId="5a87caf6b30614cd" providerId="LiveId" clId="{39387632-5FD3-4B46-8C42-CF88FC459C59}" dt="2023-01-04T17:30:55.958" v="471" actId="1076"/>
+          <ac:cxnSpMkLst>
+            <pc:docMk/>
+            <pc:sldMk cId="2440374943" sldId="275"/>
+            <ac:cxnSpMk id="7" creationId="{75FDA2B5-90F2-424A-B169-F3FE50F3C824}"/>
+          </ac:cxnSpMkLst>
+        </pc:cxnChg>
+        <pc:cxnChg chg="add mod">
+          <ac:chgData name="Dominick Lemas" userId="5a87caf6b30614cd" providerId="LiveId" clId="{39387632-5FD3-4B46-8C42-CF88FC459C59}" dt="2023-01-04T17:31:01.231" v="474" actId="14100"/>
+          <ac:cxnSpMkLst>
+            <pc:docMk/>
+            <pc:sldMk cId="2440374943" sldId="275"/>
+            <ac:cxnSpMk id="9" creationId="{E58C3821-4F44-92A5-236D-E2B69703C047}"/>
+          </ac:cxnSpMkLst>
+        </pc:cxnChg>
+      </pc:sldChg>
+      <pc:sldChg chg="addSp modSp add mod">
+        <pc:chgData name="Dominick Lemas" userId="5a87caf6b30614cd" providerId="LiveId" clId="{39387632-5FD3-4B46-8C42-CF88FC459C59}" dt="2023-01-04T17:30:09.357" v="464" actId="207"/>
+        <pc:sldMkLst>
+          <pc:docMk/>
+          <pc:sldMk cId="2025963145" sldId="276"/>
+        </pc:sldMkLst>
+        <pc:spChg chg="add mod">
+          <ac:chgData name="Dominick Lemas" userId="5a87caf6b30614cd" providerId="LiveId" clId="{39387632-5FD3-4B46-8C42-CF88FC459C59}" dt="2023-01-04T17:28:39.889" v="362" actId="1076"/>
+          <ac:spMkLst>
+            <pc:docMk/>
+            <pc:sldMk cId="2025963145" sldId="276"/>
+            <ac:spMk id="3" creationId="{AF00644C-20EB-BBC1-BF59-98D9C2E9BE12}"/>
+          </ac:spMkLst>
+        </pc:spChg>
+        <pc:spChg chg="mod">
+          <ac:chgData name="Dominick Lemas" userId="5a87caf6b30614cd" providerId="LiveId" clId="{39387632-5FD3-4B46-8C42-CF88FC459C59}" dt="2023-01-04T17:21:54.778" v="260" actId="20577"/>
+          <ac:spMkLst>
+            <pc:docMk/>
+            <pc:sldMk cId="2025963145" sldId="276"/>
+            <ac:spMk id="4" creationId="{1C0D414B-F80F-A899-4D38-B4D2CFD1EB5E}"/>
+          </ac:spMkLst>
+        </pc:spChg>
+        <pc:spChg chg="add">
+          <ac:chgData name="Dominick Lemas" userId="5a87caf6b30614cd" providerId="LiveId" clId="{39387632-5FD3-4B46-8C42-CF88FC459C59}" dt="2023-01-04T17:27:51.069" v="353" actId="11529"/>
+          <ac:spMkLst>
+            <pc:docMk/>
+            <pc:sldMk cId="2025963145" sldId="276"/>
+            <ac:spMk id="5" creationId="{C8B75B6A-324A-1F71-1CBA-EB1BB2DD2A8B}"/>
+          </ac:spMkLst>
+        </pc:spChg>
+        <pc:spChg chg="add mod">
+          <ac:chgData name="Dominick Lemas" userId="5a87caf6b30614cd" providerId="LiveId" clId="{39387632-5FD3-4B46-8C42-CF88FC459C59}" dt="2023-01-04T17:30:09.357" v="464" actId="207"/>
+          <ac:spMkLst>
+            <pc:docMk/>
+            <pc:sldMk cId="2025963145" sldId="276"/>
+            <ac:spMk id="10" creationId="{61832BAC-8C44-FD11-AC45-87DBFE318EE7}"/>
+          </ac:spMkLst>
+        </pc:spChg>
+        <pc:picChg chg="add mod">
+          <ac:chgData name="Dominick Lemas" userId="5a87caf6b30614cd" providerId="LiveId" clId="{39387632-5FD3-4B46-8C42-CF88FC459C59}" dt="2023-01-04T17:23:28.025" v="278" actId="1076"/>
+          <ac:picMkLst>
+            <pc:docMk/>
+            <pc:sldMk cId="2025963145" sldId="276"/>
+            <ac:picMk id="2" creationId="{A1F6681C-87CC-3725-3956-695FF347B51D}"/>
+          </ac:picMkLst>
+        </pc:picChg>
+        <pc:cxnChg chg="add mod">
+          <ac:chgData name="Dominick Lemas" userId="5a87caf6b30614cd" providerId="LiveId" clId="{39387632-5FD3-4B46-8C42-CF88FC459C59}" dt="2023-01-04T17:28:04.090" v="357" actId="1076"/>
+          <ac:cxnSpMkLst>
+            <pc:docMk/>
+            <pc:sldMk cId="2025963145" sldId="276"/>
+            <ac:cxnSpMk id="6" creationId="{5D71BB57-3F60-6887-242A-A9E1E6C63FEE}"/>
+          </ac:cxnSpMkLst>
+        </pc:cxnChg>
+        <pc:cxnChg chg="add mod">
+          <ac:chgData name="Dominick Lemas" userId="5a87caf6b30614cd" providerId="LiveId" clId="{39387632-5FD3-4B46-8C42-CF88FC459C59}" dt="2023-01-04T17:28:11.011" v="361" actId="1076"/>
+          <ac:cxnSpMkLst>
+            <pc:docMk/>
+            <pc:sldMk cId="2025963145" sldId="276"/>
+            <ac:cxnSpMk id="8" creationId="{894CB87D-768E-833D-5DBD-F087C2BFE2BB}"/>
+          </ac:cxnSpMkLst>
+        </pc:cxnChg>
+      </pc:sldChg>
+      <pc:sldChg chg="addSp modSp add mod">
+        <pc:chgData name="Dominick Lemas" userId="5a87caf6b30614cd" providerId="LiveId" clId="{39387632-5FD3-4B46-8C42-CF88FC459C59}" dt="2023-01-04T17:33:19.181" v="624" actId="14100"/>
+        <pc:sldMkLst>
+          <pc:docMk/>
+          <pc:sldMk cId="4028735922" sldId="277"/>
+        </pc:sldMkLst>
+        <pc:spChg chg="mod">
+          <ac:chgData name="Dominick Lemas" userId="5a87caf6b30614cd" providerId="LiveId" clId="{39387632-5FD3-4B46-8C42-CF88FC459C59}" dt="2023-01-04T17:32:27.210" v="595" actId="20577"/>
+          <ac:spMkLst>
+            <pc:docMk/>
+            <pc:sldMk cId="4028735922" sldId="277"/>
+            <ac:spMk id="2" creationId="{CB28B4E0-BD83-A256-76F1-CE0FA9FEDCA1}"/>
+          </ac:spMkLst>
+        </pc:spChg>
+        <pc:spChg chg="add">
+          <ac:chgData name="Dominick Lemas" userId="5a87caf6b30614cd" providerId="LiveId" clId="{39387632-5FD3-4B46-8C42-CF88FC459C59}" dt="2023-01-04T17:32:46.289" v="597" actId="11529"/>
+          <ac:spMkLst>
+            <pc:docMk/>
+            <pc:sldMk cId="4028735922" sldId="277"/>
+            <ac:spMk id="5" creationId="{661878BA-D9E9-CF29-745F-C8CECB44773B}"/>
+          </ac:spMkLst>
+        </pc:spChg>
+        <pc:spChg chg="add mod">
+          <ac:chgData name="Dominick Lemas" userId="5a87caf6b30614cd" providerId="LiveId" clId="{39387632-5FD3-4B46-8C42-CF88FC459C59}" dt="2023-01-04T17:32:50.811" v="599" actId="1076"/>
+          <ac:spMkLst>
+            <pc:docMk/>
+            <pc:sldMk cId="4028735922" sldId="277"/>
+            <ac:spMk id="6" creationId="{A5094AB8-CB8E-8910-027C-271360AEADC3}"/>
+          </ac:spMkLst>
+        </pc:spChg>
+        <pc:spChg chg="add mod">
+          <ac:chgData name="Dominick Lemas" userId="5a87caf6b30614cd" providerId="LiveId" clId="{39387632-5FD3-4B46-8C42-CF88FC459C59}" dt="2023-01-04T17:32:58.499" v="615" actId="20577"/>
+          <ac:spMkLst>
+            <pc:docMk/>
+            <pc:sldMk cId="4028735922" sldId="277"/>
+            <ac:spMk id="7" creationId="{EC74D7EB-7383-9E45-F225-2289CDBE7BAA}"/>
+          </ac:spMkLst>
+        </pc:spChg>
+        <pc:spChg chg="add mod">
+          <ac:chgData name="Dominick Lemas" userId="5a87caf6b30614cd" providerId="LiveId" clId="{39387632-5FD3-4B46-8C42-CF88FC459C59}" dt="2023-01-04T17:33:10.580" v="623" actId="20577"/>
+          <ac:spMkLst>
+            <pc:docMk/>
+            <pc:sldMk cId="4028735922" sldId="277"/>
+            <ac:spMk id="8" creationId="{FF9DF15A-087E-36BB-AEB5-8C9586D5779E}"/>
+          </ac:spMkLst>
+        </pc:spChg>
+        <pc:cxnChg chg="add mod">
+          <ac:chgData name="Dominick Lemas" userId="5a87caf6b30614cd" providerId="LiveId" clId="{39387632-5FD3-4B46-8C42-CF88FC459C59}" dt="2023-01-04T17:33:19.181" v="624" actId="14100"/>
+          <ac:cxnSpMkLst>
+            <pc:docMk/>
+            <pc:sldMk cId="4028735922" sldId="277"/>
+            <ac:cxnSpMk id="4" creationId="{AD82EAB8-3714-2791-3989-835F0B0962E5}"/>
+          </ac:cxnSpMkLst>
+        </pc:cxnChg>
+      </pc:sldChg>
+      <pc:sldChg chg="addSp delSp modSp new mod">
+        <pc:chgData name="Dominick Lemas" userId="5a87caf6b30614cd" providerId="LiveId" clId="{39387632-5FD3-4B46-8C42-CF88FC459C59}" dt="2023-01-04T17:25:50.739" v="326" actId="20577"/>
+        <pc:sldMkLst>
+          <pc:docMk/>
+          <pc:sldMk cId="1583123211" sldId="278"/>
+        </pc:sldMkLst>
+        <pc:spChg chg="del">
+          <ac:chgData name="Dominick Lemas" userId="5a87caf6b30614cd" providerId="LiveId" clId="{39387632-5FD3-4B46-8C42-CF88FC459C59}" dt="2023-01-04T17:24:40.314" v="291" actId="478"/>
+          <ac:spMkLst>
+            <pc:docMk/>
+            <pc:sldMk cId="1583123211" sldId="278"/>
+            <ac:spMk id="2" creationId="{BEC47CFA-B26A-96E6-244C-E3DD8699772D}"/>
+          </ac:spMkLst>
+        </pc:spChg>
+        <pc:spChg chg="del">
+          <ac:chgData name="Dominick Lemas" userId="5a87caf6b30614cd" providerId="LiveId" clId="{39387632-5FD3-4B46-8C42-CF88FC459C59}" dt="2023-01-04T17:24:39.146" v="290" actId="478"/>
+          <ac:spMkLst>
+            <pc:docMk/>
+            <pc:sldMk cId="1583123211" sldId="278"/>
+            <ac:spMk id="3" creationId="{C06A3A41-C335-6B3D-538D-6203B72E8B49}"/>
+          </ac:spMkLst>
+        </pc:spChg>
+        <pc:spChg chg="add mod">
+          <ac:chgData name="Dominick Lemas" userId="5a87caf6b30614cd" providerId="LiveId" clId="{39387632-5FD3-4B46-8C42-CF88FC459C59}" dt="2023-01-04T17:25:50.739" v="326" actId="20577"/>
+          <ac:spMkLst>
+            <pc:docMk/>
+            <pc:sldMk cId="1583123211" sldId="278"/>
+            <ac:spMk id="9" creationId="{58EFF7D3-BD58-F0D5-9BAD-0E45164A9D24}"/>
+          </ac:spMkLst>
+        </pc:spChg>
+        <pc:picChg chg="add mod modCrop">
+          <ac:chgData name="Dominick Lemas" userId="5a87caf6b30614cd" providerId="LiveId" clId="{39387632-5FD3-4B46-8C42-CF88FC459C59}" dt="2023-01-04T17:25:07.611" v="298" actId="14100"/>
+          <ac:picMkLst>
+            <pc:docMk/>
+            <pc:sldMk cId="1583123211" sldId="278"/>
+            <ac:picMk id="5" creationId="{20965776-D60D-5356-D546-1EF0FFC9AF84}"/>
+          </ac:picMkLst>
+        </pc:picChg>
+        <pc:cxnChg chg="add mod">
+          <ac:chgData name="Dominick Lemas" userId="5a87caf6b30614cd" providerId="LiveId" clId="{39387632-5FD3-4B46-8C42-CF88FC459C59}" dt="2023-01-04T17:25:30.618" v="303" actId="1076"/>
+          <ac:cxnSpMkLst>
+            <pc:docMk/>
+            <pc:sldMk cId="1583123211" sldId="278"/>
+            <ac:cxnSpMk id="7" creationId="{99BE4D42-BC12-6F4B-82A9-440B0BC689CA}"/>
+          </ac:cxnSpMkLst>
+        </pc:cxnChg>
       </pc:sldChg>
     </pc:docChg>
   </pc:docChgLst>
@@ -540,7 +820,7 @@
           <a:p>
             <a:fld id="{9C265EF0-502A-4E0B-8E98-AD01A0E011A7}" type="datetimeFigureOut">
               <a:rPr lang="en-US" smtClean="0"/>
-              <a:t>10/18/2022</a:t>
+              <a:t>1/4/2023</a:t>
             </a:fld>
             <a:endParaRPr lang="en-US"/>
           </a:p>
@@ -708,7 +988,7 @@
           <a:p>
             <a:fld id="{9C265EF0-502A-4E0B-8E98-AD01A0E011A7}" type="datetimeFigureOut">
               <a:rPr lang="en-US" smtClean="0"/>
-              <a:t>10/18/2022</a:t>
+              <a:t>1/4/2023</a:t>
             </a:fld>
             <a:endParaRPr lang="en-US"/>
           </a:p>
@@ -886,7 +1166,7 @@
           <a:p>
             <a:fld id="{9C265EF0-502A-4E0B-8E98-AD01A0E011A7}" type="datetimeFigureOut">
               <a:rPr lang="en-US" smtClean="0"/>
-              <a:t>10/18/2022</a:t>
+              <a:t>1/4/2023</a:t>
             </a:fld>
             <a:endParaRPr lang="en-US"/>
           </a:p>
@@ -1054,7 +1334,7 @@
           <a:p>
             <a:fld id="{9C265EF0-502A-4E0B-8E98-AD01A0E011A7}" type="datetimeFigureOut">
               <a:rPr lang="en-US" smtClean="0"/>
-              <a:t>10/18/2022</a:t>
+              <a:t>1/4/2023</a:t>
             </a:fld>
             <a:endParaRPr lang="en-US"/>
           </a:p>
@@ -1299,7 +1579,7 @@
           <a:p>
             <a:fld id="{9C265EF0-502A-4E0B-8E98-AD01A0E011A7}" type="datetimeFigureOut">
               <a:rPr lang="en-US" smtClean="0"/>
-              <a:t>10/18/2022</a:t>
+              <a:t>1/4/2023</a:t>
             </a:fld>
             <a:endParaRPr lang="en-US"/>
           </a:p>
@@ -1528,7 +1808,7 @@
           <a:p>
             <a:fld id="{9C265EF0-502A-4E0B-8E98-AD01A0E011A7}" type="datetimeFigureOut">
               <a:rPr lang="en-US" smtClean="0"/>
-              <a:t>10/18/2022</a:t>
+              <a:t>1/4/2023</a:t>
             </a:fld>
             <a:endParaRPr lang="en-US"/>
           </a:p>
@@ -1892,7 +2172,7 @@
           <a:p>
             <a:fld id="{9C265EF0-502A-4E0B-8E98-AD01A0E011A7}" type="datetimeFigureOut">
               <a:rPr lang="en-US" smtClean="0"/>
-              <a:t>10/18/2022</a:t>
+              <a:t>1/4/2023</a:t>
             </a:fld>
             <a:endParaRPr lang="en-US"/>
           </a:p>
@@ -2009,7 +2289,7 @@
           <a:p>
             <a:fld id="{9C265EF0-502A-4E0B-8E98-AD01A0E011A7}" type="datetimeFigureOut">
               <a:rPr lang="en-US" smtClean="0"/>
-              <a:t>10/18/2022</a:t>
+              <a:t>1/4/2023</a:t>
             </a:fld>
             <a:endParaRPr lang="en-US"/>
           </a:p>
@@ -2104,7 +2384,7 @@
           <a:p>
             <a:fld id="{9C265EF0-502A-4E0B-8E98-AD01A0E011A7}" type="datetimeFigureOut">
               <a:rPr lang="en-US" smtClean="0"/>
-              <a:t>10/18/2022</a:t>
+              <a:t>1/4/2023</a:t>
             </a:fld>
             <a:endParaRPr lang="en-US"/>
           </a:p>
@@ -2379,7 +2659,7 @@
           <a:p>
             <a:fld id="{9C265EF0-502A-4E0B-8E98-AD01A0E011A7}" type="datetimeFigureOut">
               <a:rPr lang="en-US" smtClean="0"/>
-              <a:t>10/18/2022</a:t>
+              <a:t>1/4/2023</a:t>
             </a:fld>
             <a:endParaRPr lang="en-US"/>
           </a:p>
@@ -2631,7 +2911,7 @@
           <a:p>
             <a:fld id="{9C265EF0-502A-4E0B-8E98-AD01A0E011A7}" type="datetimeFigureOut">
               <a:rPr lang="en-US" smtClean="0"/>
-              <a:t>10/18/2022</a:t>
+              <a:t>1/4/2023</a:t>
             </a:fld>
             <a:endParaRPr lang="en-US"/>
           </a:p>
@@ -2842,7 +3122,7 @@
           <a:p>
             <a:fld id="{9C265EF0-502A-4E0B-8E98-AD01A0E011A7}" type="datetimeFigureOut">
               <a:rPr lang="en-US" smtClean="0"/>
-              <a:t>10/18/2022</a:t>
+              <a:t>1/4/2023</a:t>
             </a:fld>
             <a:endParaRPr lang="en-US"/>
           </a:p>
@@ -3344,6 +3624,100 @@
 </p:sld>
 </file>
 
+<file path=ppt/slides/slide10.xml><?xml version="1.0" encoding="utf-8"?>
+<p:sld xmlns:a="http://schemas.openxmlformats.org/drawingml/2006/main" xmlns:r="http://schemas.openxmlformats.org/officeDocument/2006/relationships" xmlns:p="http://schemas.openxmlformats.org/presentationml/2006/main">
+  <p:cSld>
+    <p:spTree>
+      <p:nvGrpSpPr>
+        <p:cNvPr id="1" name=""/>
+        <p:cNvGrpSpPr/>
+        <p:nvPr/>
+      </p:nvGrpSpPr>
+      <p:grpSpPr>
+        <a:xfrm>
+          <a:off x="0" y="0"/>
+          <a:ext cx="0" cy="0"/>
+          <a:chOff x="0" y="0"/>
+          <a:chExt cx="0" cy="0"/>
+        </a:xfrm>
+      </p:grpSpPr>
+      <p:sp>
+        <p:nvSpPr>
+          <p:cNvPr id="2" name="Title 1">
+            <a:extLst>
+              <a:ext uri="{FF2B5EF4-FFF2-40B4-BE49-F238E27FC236}">
+                <a16:creationId xmlns:a16="http://schemas.microsoft.com/office/drawing/2014/main" id="{63B6EC4C-6DDF-482E-8EED-85C7D405DE6E}"/>
+              </a:ext>
+            </a:extLst>
+          </p:cNvPr>
+          <p:cNvSpPr>
+            <a:spLocks noGrp="1"/>
+          </p:cNvSpPr>
+          <p:nvPr>
+            <p:ph type="title"/>
+          </p:nvPr>
+        </p:nvSpPr>
+        <p:spPr/>
+        <p:txBody>
+          <a:bodyPr/>
+          <a:lstStyle/>
+          <a:p>
+            <a:r>
+              <a:rPr lang="en-US" dirty="0"/>
+              <a:t>Results</a:t>
+            </a:r>
+          </a:p>
+        </p:txBody>
+      </p:sp>
+      <p:pic>
+        <p:nvPicPr>
+          <p:cNvPr id="5" name="Picture 4">
+            <a:extLst>
+              <a:ext uri="{FF2B5EF4-FFF2-40B4-BE49-F238E27FC236}">
+                <a16:creationId xmlns:a16="http://schemas.microsoft.com/office/drawing/2014/main" id="{A95A1956-0640-684C-8771-A1B2ACAE76A2}"/>
+              </a:ext>
+            </a:extLst>
+          </p:cNvPr>
+          <p:cNvPicPr>
+            <a:picLocks noChangeAspect="1"/>
+          </p:cNvPicPr>
+          <p:nvPr/>
+        </p:nvPicPr>
+        <p:blipFill>
+          <a:blip r:embed="rId2">
+            <a:extLst>
+              <a:ext uri="{28A0092B-C50C-407E-A947-70E740481C1C}">
+                <a14:useLocalDpi xmlns:a14="http://schemas.microsoft.com/office/drawing/2010/main" val="0"/>
+              </a:ext>
+            </a:extLst>
+          </a:blip>
+          <a:stretch>
+            <a:fillRect/>
+          </a:stretch>
+        </p:blipFill>
+        <p:spPr>
+          <a:xfrm>
+            <a:off x="5715728" y="365125"/>
+            <a:ext cx="6007100" cy="5842000"/>
+          </a:xfrm>
+          <a:prstGeom prst="rect">
+            <a:avLst/>
+          </a:prstGeom>
+        </p:spPr>
+      </p:pic>
+    </p:spTree>
+    <p:extLst>
+      <p:ext uri="{BB962C8B-B14F-4D97-AF65-F5344CB8AC3E}">
+        <p14:creationId xmlns:p14="http://schemas.microsoft.com/office/powerpoint/2010/main" val="1040544742"/>
+      </p:ext>
+    </p:extLst>
+  </p:cSld>
+  <p:clrMapOvr>
+    <a:masterClrMapping/>
+  </p:clrMapOvr>
+</p:sld>
+</file>
+
 <file path=ppt/slides/slide2.xml><?xml version="1.0" encoding="utf-8"?>
 <p:sld xmlns:a="http://schemas.openxmlformats.org/drawingml/2006/main" xmlns:r="http://schemas.openxmlformats.org/officeDocument/2006/relationships" xmlns:p="http://schemas.openxmlformats.org/presentationml/2006/main">
   <p:cSld>
@@ -4586,16 +4960,143 @@
           </a:lstStyle>
           <a:p>
             <a:r>
-              <a:rPr lang="en-US" sz="3200" dirty="0" err="1"/>
-              <a:t>Format_RedCapData</a:t>
-            </a:r>
-            <a:r>
               <a:rPr lang="en-US" sz="3200" dirty="0"/>
-              <a:t> Workflow</a:t>
-            </a:r>
-          </a:p>
-        </p:txBody>
-      </p:sp>
+              <a:t>BEACH Analysis Workflow</a:t>
+            </a:r>
+          </a:p>
+        </p:txBody>
+      </p:sp>
+      <p:pic>
+        <p:nvPicPr>
+          <p:cNvPr id="2" name="Picture 4" descr="REDCap - Services - UTH BIG - The University of Texas Health Science Center  at Houston (UTHealth) School of Biomedical Informatics">
+            <a:extLst>
+              <a:ext uri="{FF2B5EF4-FFF2-40B4-BE49-F238E27FC236}">
+                <a16:creationId xmlns:a16="http://schemas.microsoft.com/office/drawing/2014/main" id="{F38A6BF7-A292-2542-97FC-5A81FFD718BF}"/>
+              </a:ext>
+            </a:extLst>
+          </p:cNvPr>
+          <p:cNvPicPr>
+            <a:picLocks noChangeAspect="1" noChangeArrowheads="1"/>
+          </p:cNvPicPr>
+          <p:nvPr/>
+        </p:nvPicPr>
+        <p:blipFill rotWithShape="1">
+          <a:blip r:embed="rId2">
+            <a:extLst>
+              <a:ext uri="{28A0092B-C50C-407E-A947-70E740481C1C}">
+                <a14:useLocalDpi xmlns:a14="http://schemas.microsoft.com/office/drawing/2010/main" val="0"/>
+              </a:ext>
+            </a:extLst>
+          </a:blip>
+          <a:srcRect l="9438" t="16281" r="7423" b="19225"/>
+          <a:stretch/>
+        </p:blipFill>
+        <p:spPr bwMode="auto">
+          <a:xfrm>
+            <a:off x="901932" y="2261134"/>
+            <a:ext cx="2249223" cy="714039"/>
+          </a:xfrm>
+          <a:prstGeom prst="rect">
+            <a:avLst/>
+          </a:prstGeom>
+          <a:noFill/>
+          <a:extLst>
+            <a:ext uri="{909E8E84-426E-40DD-AFC4-6F175D3DCCD1}">
+              <a14:hiddenFill xmlns:a14="http://schemas.microsoft.com/office/drawing/2010/main">
+                <a:solidFill>
+                  <a:srgbClr val="FFFFFF"/>
+                </a:solidFill>
+              </a14:hiddenFill>
+            </a:ext>
+          </a:extLst>
+        </p:spPr>
+      </p:pic>
+      <p:sp>
+        <p:nvSpPr>
+          <p:cNvPr id="3" name="TextBox 2">
+            <a:extLst>
+              <a:ext uri="{FF2B5EF4-FFF2-40B4-BE49-F238E27FC236}">
+                <a16:creationId xmlns:a16="http://schemas.microsoft.com/office/drawing/2014/main" id="{CB9D9483-62F4-23E9-7584-C9718015A7B8}"/>
+              </a:ext>
+            </a:extLst>
+          </p:cNvPr>
+          <p:cNvSpPr txBox="1"/>
+          <p:nvPr/>
+        </p:nvSpPr>
+        <p:spPr>
+          <a:xfrm>
+            <a:off x="5342021" y="2165684"/>
+            <a:ext cx="4848726" cy="923330"/>
+          </a:xfrm>
+          <a:prstGeom prst="rect">
+            <a:avLst/>
+          </a:prstGeom>
+          <a:noFill/>
+        </p:spPr>
+        <p:txBody>
+          <a:bodyPr wrap="square" rtlCol="0">
+            <a:spAutoFit/>
+          </a:bodyPr>
+          <a:lstStyle/>
+          <a:p>
+            <a:r>
+              <a:rPr lang="en-US" dirty="0"/>
+              <a:t>Get</a:t>
+            </a:r>
+          </a:p>
+          <a:p>
+            <a:r>
+              <a:rPr lang="en-US" dirty="0"/>
+              <a:t>Format</a:t>
+            </a:r>
+          </a:p>
+          <a:p>
+            <a:r>
+              <a:rPr lang="en-US" dirty="0"/>
+              <a:t>build</a:t>
+            </a:r>
+          </a:p>
+        </p:txBody>
+      </p:sp>
+      <p:cxnSp>
+        <p:nvCxnSpPr>
+          <p:cNvPr id="6" name="Straight Arrow Connector 5">
+            <a:extLst>
+              <a:ext uri="{FF2B5EF4-FFF2-40B4-BE49-F238E27FC236}">
+                <a16:creationId xmlns:a16="http://schemas.microsoft.com/office/drawing/2014/main" id="{683C5E25-3F87-C815-1C9E-EFF6A1B6526D}"/>
+              </a:ext>
+            </a:extLst>
+          </p:cNvPr>
+          <p:cNvCxnSpPr/>
+          <p:nvPr/>
+        </p:nvCxnSpPr>
+        <p:spPr>
+          <a:xfrm>
+            <a:off x="745958" y="1503947"/>
+            <a:ext cx="9059779" cy="0"/>
+          </a:xfrm>
+          <a:prstGeom prst="straightConnector1">
+            <a:avLst/>
+          </a:prstGeom>
+          <a:ln w="76200">
+            <a:tailEnd type="triangle"/>
+          </a:ln>
+        </p:spPr>
+        <p:style>
+          <a:lnRef idx="1">
+            <a:schemeClr val="accent1"/>
+          </a:lnRef>
+          <a:fillRef idx="0">
+            <a:schemeClr val="accent1"/>
+          </a:fillRef>
+          <a:effectRef idx="0">
+            <a:schemeClr val="accent1"/>
+          </a:effectRef>
+          <a:fontRef idx="minor">
+            <a:schemeClr val="tx1"/>
+          </a:fontRef>
+        </p:style>
+      </p:cxnSp>
     </p:spTree>
     <p:extLst>
       <p:ext uri="{BB962C8B-B14F-4D97-AF65-F5344CB8AC3E}">
@@ -4674,10 +5175,805 @@
           </a:lstStyle>
           <a:p>
             <a:r>
-              <a:rPr lang="en-US" sz="3200"/>
-              <a:t>report Workflow</a:t>
-            </a:r>
-            <a:endParaRPr lang="en-US" sz="3200" dirty="0"/>
+              <a:rPr lang="en-US" sz="3200" dirty="0"/>
+              <a:t>BEACH Analysis Workflow: get()</a:t>
+            </a:r>
+          </a:p>
+        </p:txBody>
+      </p:sp>
+      <p:pic>
+        <p:nvPicPr>
+          <p:cNvPr id="2" name="Picture 4" descr="REDCap - Services - UTH BIG - The University of Texas Health Science Center  at Houston (UTHealth) School of Biomedical Informatics">
+            <a:extLst>
+              <a:ext uri="{FF2B5EF4-FFF2-40B4-BE49-F238E27FC236}">
+                <a16:creationId xmlns:a16="http://schemas.microsoft.com/office/drawing/2014/main" id="{A1F6681C-87CC-3725-3956-695FF347B51D}"/>
+              </a:ext>
+            </a:extLst>
+          </p:cNvPr>
+          <p:cNvPicPr>
+            <a:picLocks noChangeAspect="1" noChangeArrowheads="1"/>
+          </p:cNvPicPr>
+          <p:nvPr/>
+        </p:nvPicPr>
+        <p:blipFill rotWithShape="1">
+          <a:blip r:embed="rId2">
+            <a:extLst>
+              <a:ext uri="{28A0092B-C50C-407E-A947-70E740481C1C}">
+                <a14:useLocalDpi xmlns:a14="http://schemas.microsoft.com/office/drawing/2010/main" val="0"/>
+              </a:ext>
+            </a:extLst>
+          </a:blip>
+          <a:srcRect l="9438" t="16281" r="7423" b="19225"/>
+          <a:stretch/>
+        </p:blipFill>
+        <p:spPr bwMode="auto">
+          <a:xfrm>
+            <a:off x="697395" y="2417545"/>
+            <a:ext cx="2249223" cy="714039"/>
+          </a:xfrm>
+          <a:prstGeom prst="rect">
+            <a:avLst/>
+          </a:prstGeom>
+          <a:noFill/>
+          <a:extLst>
+            <a:ext uri="{909E8E84-426E-40DD-AFC4-6F175D3DCCD1}">
+              <a14:hiddenFill xmlns:a14="http://schemas.microsoft.com/office/drawing/2010/main">
+                <a:solidFill>
+                  <a:srgbClr val="FFFFFF"/>
+                </a:solidFill>
+              </a14:hiddenFill>
+            </a:ext>
+          </a:extLst>
+        </p:spPr>
+      </p:pic>
+      <p:sp>
+        <p:nvSpPr>
+          <p:cNvPr id="3" name="TextBox 2">
+            <a:extLst>
+              <a:ext uri="{FF2B5EF4-FFF2-40B4-BE49-F238E27FC236}">
+                <a16:creationId xmlns:a16="http://schemas.microsoft.com/office/drawing/2014/main" id="{AF00644C-20EB-BBC1-BF59-98D9C2E9BE12}"/>
+              </a:ext>
+            </a:extLst>
+          </p:cNvPr>
+          <p:cNvSpPr txBox="1"/>
+          <p:nvPr/>
+        </p:nvSpPr>
+        <p:spPr>
+          <a:xfrm>
+            <a:off x="3846777" y="1419784"/>
+            <a:ext cx="2249223" cy="923330"/>
+          </a:xfrm>
+          <a:prstGeom prst="rect">
+            <a:avLst/>
+          </a:prstGeom>
+          <a:noFill/>
+        </p:spPr>
+        <p:txBody>
+          <a:bodyPr wrap="square" rtlCol="0">
+            <a:spAutoFit/>
+          </a:bodyPr>
+          <a:lstStyle/>
+          <a:p>
+            <a:r>
+              <a:rPr lang="en-US" dirty="0"/>
+              <a:t>Reports</a:t>
+            </a:r>
+          </a:p>
+          <a:p>
+            <a:pPr marL="285750" indent="-285750">
+              <a:buFont typeface="Arial" panose="020B0604020202020204" pitchFamily="34" charset="0"/>
+              <a:buChar char="•"/>
+            </a:pPr>
+            <a:r>
+              <a:rPr lang="en-US" dirty="0"/>
+              <a:t>Report Name</a:t>
+            </a:r>
+          </a:p>
+          <a:p>
+            <a:pPr marL="285750" indent="-285750">
+              <a:buFont typeface="Arial" panose="020B0604020202020204" pitchFamily="34" charset="0"/>
+              <a:buChar char="•"/>
+            </a:pPr>
+            <a:r>
+              <a:rPr lang="en-US" dirty="0"/>
+              <a:t>Report ID</a:t>
+            </a:r>
+          </a:p>
+        </p:txBody>
+      </p:sp>
+      <p:sp>
+        <p:nvSpPr>
+          <p:cNvPr id="5" name="Rectangle: Rounded Corners 4">
+            <a:extLst>
+              <a:ext uri="{FF2B5EF4-FFF2-40B4-BE49-F238E27FC236}">
+                <a16:creationId xmlns:a16="http://schemas.microsoft.com/office/drawing/2014/main" id="{C8B75B6A-324A-1F71-1CBA-EB1BB2DD2A8B}"/>
+              </a:ext>
+            </a:extLst>
+          </p:cNvPr>
+          <p:cNvSpPr/>
+          <p:nvPr/>
+        </p:nvSpPr>
+        <p:spPr>
+          <a:xfrm>
+            <a:off x="6833937" y="1455821"/>
+            <a:ext cx="5101389" cy="1239253"/>
+          </a:xfrm>
+          <a:prstGeom prst="roundRect">
+            <a:avLst/>
+          </a:prstGeom>
+        </p:spPr>
+        <p:style>
+          <a:lnRef idx="2">
+            <a:schemeClr val="accent1">
+              <a:shade val="50000"/>
+            </a:schemeClr>
+          </a:lnRef>
+          <a:fillRef idx="1">
+            <a:schemeClr val="accent1"/>
+          </a:fillRef>
+          <a:effectRef idx="0">
+            <a:schemeClr val="accent1"/>
+          </a:effectRef>
+          <a:fontRef idx="minor">
+            <a:schemeClr val="lt1"/>
+          </a:fontRef>
+        </p:style>
+        <p:txBody>
+          <a:bodyPr rtlCol="0" anchor="ctr"/>
+          <a:lstStyle/>
+          <a:p>
+            <a:pPr algn="ctr"/>
+            <a:endParaRPr lang="en-US"/>
+          </a:p>
+        </p:txBody>
+      </p:sp>
+      <p:cxnSp>
+        <p:nvCxnSpPr>
+          <p:cNvPr id="6" name="Straight Arrow Connector 5">
+            <a:extLst>
+              <a:ext uri="{FF2B5EF4-FFF2-40B4-BE49-F238E27FC236}">
+                <a16:creationId xmlns:a16="http://schemas.microsoft.com/office/drawing/2014/main" id="{5D71BB57-3F60-6887-242A-A9E1E6C63FEE}"/>
+              </a:ext>
+            </a:extLst>
+          </p:cNvPr>
+          <p:cNvCxnSpPr>
+            <a:cxnSpLocks/>
+          </p:cNvCxnSpPr>
+          <p:nvPr/>
+        </p:nvCxnSpPr>
+        <p:spPr>
+          <a:xfrm>
+            <a:off x="6833937" y="1247592"/>
+            <a:ext cx="1014527" cy="655415"/>
+          </a:xfrm>
+          <a:prstGeom prst="straightConnector1">
+            <a:avLst/>
+          </a:prstGeom>
+          <a:ln w="76200">
+            <a:solidFill>
+              <a:srgbClr val="FF0000"/>
+            </a:solidFill>
+            <a:tailEnd type="triangle"/>
+          </a:ln>
+        </p:spPr>
+        <p:style>
+          <a:lnRef idx="1">
+            <a:schemeClr val="accent1"/>
+          </a:lnRef>
+          <a:fillRef idx="0">
+            <a:schemeClr val="accent1"/>
+          </a:fillRef>
+          <a:effectRef idx="0">
+            <a:schemeClr val="accent1"/>
+          </a:effectRef>
+          <a:fontRef idx="minor">
+            <a:schemeClr val="tx1"/>
+          </a:fontRef>
+        </p:style>
+      </p:cxnSp>
+      <p:cxnSp>
+        <p:nvCxnSpPr>
+          <p:cNvPr id="8" name="Straight Arrow Connector 7">
+            <a:extLst>
+              <a:ext uri="{FF2B5EF4-FFF2-40B4-BE49-F238E27FC236}">
+                <a16:creationId xmlns:a16="http://schemas.microsoft.com/office/drawing/2014/main" id="{894CB87D-768E-833D-5DBD-F087C2BFE2BB}"/>
+              </a:ext>
+            </a:extLst>
+          </p:cNvPr>
+          <p:cNvCxnSpPr>
+            <a:cxnSpLocks/>
+          </p:cNvCxnSpPr>
+          <p:nvPr/>
+        </p:nvCxnSpPr>
+        <p:spPr>
+          <a:xfrm flipH="1">
+            <a:off x="10941194" y="1247592"/>
+            <a:ext cx="573026" cy="633857"/>
+          </a:xfrm>
+          <a:prstGeom prst="straightConnector1">
+            <a:avLst/>
+          </a:prstGeom>
+          <a:ln w="76200">
+            <a:solidFill>
+              <a:srgbClr val="FF0000"/>
+            </a:solidFill>
+            <a:tailEnd type="triangle"/>
+          </a:ln>
+        </p:spPr>
+        <p:style>
+          <a:lnRef idx="1">
+            <a:schemeClr val="accent1"/>
+          </a:lnRef>
+          <a:fillRef idx="0">
+            <a:schemeClr val="accent1"/>
+          </a:fillRef>
+          <a:effectRef idx="0">
+            <a:schemeClr val="accent1"/>
+          </a:effectRef>
+          <a:fontRef idx="minor">
+            <a:schemeClr val="tx1"/>
+          </a:fontRef>
+        </p:style>
+      </p:cxnSp>
+      <p:sp>
+        <p:nvSpPr>
+          <p:cNvPr id="10" name="TextBox 9">
+            <a:extLst>
+              <a:ext uri="{FF2B5EF4-FFF2-40B4-BE49-F238E27FC236}">
+                <a16:creationId xmlns:a16="http://schemas.microsoft.com/office/drawing/2014/main" id="{61832BAC-8C44-FD11-AC45-87DBFE318EE7}"/>
+              </a:ext>
+            </a:extLst>
+          </p:cNvPr>
+          <p:cNvSpPr txBox="1"/>
+          <p:nvPr/>
+        </p:nvSpPr>
+        <p:spPr>
+          <a:xfrm>
+            <a:off x="2548621" y="5610408"/>
+            <a:ext cx="7094757" cy="369332"/>
+          </a:xfrm>
+          <a:prstGeom prst="rect">
+            <a:avLst/>
+          </a:prstGeom>
+          <a:solidFill>
+            <a:srgbClr val="FFFF00"/>
+          </a:solidFill>
+        </p:spPr>
+        <p:txBody>
+          <a:bodyPr wrap="square" rtlCol="0">
+            <a:spAutoFit/>
+          </a:bodyPr>
+          <a:lstStyle/>
+          <a:p>
+            <a:r>
+              <a:rPr lang="en-US" dirty="0"/>
+              <a:t>NOTE: Make sure all variables of interest are included in the report.</a:t>
+            </a:r>
+          </a:p>
+        </p:txBody>
+      </p:sp>
+    </p:spTree>
+    <p:extLst>
+      <p:ext uri="{BB962C8B-B14F-4D97-AF65-F5344CB8AC3E}">
+        <p14:creationId xmlns:p14="http://schemas.microsoft.com/office/powerpoint/2010/main" val="2025963145"/>
+      </p:ext>
+    </p:extLst>
+  </p:cSld>
+  <p:clrMapOvr>
+    <a:masterClrMapping/>
+  </p:clrMapOvr>
+</p:sld>
+</file>
+
+<file path=ppt/slides/slide6.xml><?xml version="1.0" encoding="utf-8"?>
+<p:sld xmlns:a="http://schemas.openxmlformats.org/drawingml/2006/main" xmlns:r="http://schemas.openxmlformats.org/officeDocument/2006/relationships" xmlns:p="http://schemas.openxmlformats.org/presentationml/2006/main">
+  <p:cSld>
+    <p:spTree>
+      <p:nvGrpSpPr>
+        <p:cNvPr id="1" name=""/>
+        <p:cNvGrpSpPr/>
+        <p:nvPr/>
+      </p:nvGrpSpPr>
+      <p:grpSpPr>
+        <a:xfrm>
+          <a:off x="0" y="0"/>
+          <a:ext cx="0" cy="0"/>
+          <a:chOff x="0" y="0"/>
+          <a:chExt cx="0" cy="0"/>
+        </a:xfrm>
+      </p:grpSpPr>
+      <p:sp>
+        <p:nvSpPr>
+          <p:cNvPr id="2" name="Title 1">
+            <a:extLst>
+              <a:ext uri="{FF2B5EF4-FFF2-40B4-BE49-F238E27FC236}">
+                <a16:creationId xmlns:a16="http://schemas.microsoft.com/office/drawing/2014/main" id="{CB28B4E0-BD83-A256-76F1-CE0FA9FEDCA1}"/>
+              </a:ext>
+            </a:extLst>
+          </p:cNvPr>
+          <p:cNvSpPr txBox="1">
+            <a:spLocks/>
+          </p:cNvSpPr>
+          <p:nvPr/>
+        </p:nvSpPr>
+        <p:spPr>
+          <a:xfrm>
+            <a:off x="383552" y="354778"/>
+            <a:ext cx="10515600" cy="743238"/>
+          </a:xfrm>
+          <a:prstGeom prst="rect">
+            <a:avLst/>
+          </a:prstGeom>
+        </p:spPr>
+        <p:txBody>
+          <a:bodyPr vert="horz" lIns="91440" tIns="45720" rIns="91440" bIns="45720" rtlCol="0" anchor="ctr">
+            <a:normAutofit/>
+          </a:bodyPr>
+          <a:lstStyle>
+            <a:lvl1pPr algn="l" defTabSz="914400" rtl="0" eaLnBrk="1" latinLnBrk="0" hangingPunct="1">
+              <a:lnSpc>
+                <a:spcPct val="90000"/>
+              </a:lnSpc>
+              <a:spcBef>
+                <a:spcPct val="0"/>
+              </a:spcBef>
+              <a:buNone/>
+              <a:defRPr sz="4400" kern="1200">
+                <a:solidFill>
+                  <a:schemeClr val="tx1"/>
+                </a:solidFill>
+                <a:latin typeface="+mj-lt"/>
+                <a:ea typeface="+mj-ea"/>
+                <a:cs typeface="+mj-cs"/>
+              </a:defRPr>
+            </a:lvl1pPr>
+          </a:lstStyle>
+          <a:p>
+            <a:r>
+              <a:rPr lang="en-US" sz="3200" dirty="0"/>
+              <a:t>BEACH Analysis Workflow: format()</a:t>
+            </a:r>
+          </a:p>
+        </p:txBody>
+      </p:sp>
+      <p:sp>
+        <p:nvSpPr>
+          <p:cNvPr id="3" name="Cloud 2">
+            <a:extLst>
+              <a:ext uri="{FF2B5EF4-FFF2-40B4-BE49-F238E27FC236}">
+                <a16:creationId xmlns:a16="http://schemas.microsoft.com/office/drawing/2014/main" id="{EB0A1642-C7F2-ADEE-908B-7853CCE88B78}"/>
+              </a:ext>
+            </a:extLst>
+          </p:cNvPr>
+          <p:cNvSpPr/>
+          <p:nvPr/>
+        </p:nvSpPr>
+        <p:spPr>
+          <a:xfrm>
+            <a:off x="4600620" y="1359568"/>
+            <a:ext cx="2081463" cy="1359569"/>
+          </a:xfrm>
+          <a:prstGeom prst="cloud">
+            <a:avLst/>
+          </a:prstGeom>
+        </p:spPr>
+        <p:style>
+          <a:lnRef idx="2">
+            <a:schemeClr val="accent1">
+              <a:shade val="50000"/>
+            </a:schemeClr>
+          </a:lnRef>
+          <a:fillRef idx="1">
+            <a:schemeClr val="accent1"/>
+          </a:fillRef>
+          <a:effectRef idx="0">
+            <a:schemeClr val="accent1"/>
+          </a:effectRef>
+          <a:fontRef idx="minor">
+            <a:schemeClr val="lt1"/>
+          </a:fontRef>
+        </p:style>
+        <p:txBody>
+          <a:bodyPr rtlCol="0" anchor="ctr"/>
+          <a:lstStyle/>
+          <a:p>
+            <a:pPr algn="ctr"/>
+            <a:endParaRPr lang="en-US"/>
+          </a:p>
+        </p:txBody>
+      </p:sp>
+      <p:cxnSp>
+        <p:nvCxnSpPr>
+          <p:cNvPr id="6" name="Straight Arrow Connector 5">
+            <a:extLst>
+              <a:ext uri="{FF2B5EF4-FFF2-40B4-BE49-F238E27FC236}">
+                <a16:creationId xmlns:a16="http://schemas.microsoft.com/office/drawing/2014/main" id="{18E64C48-C163-7CB6-C4B3-63D7957FB494}"/>
+              </a:ext>
+            </a:extLst>
+          </p:cNvPr>
+          <p:cNvCxnSpPr/>
+          <p:nvPr/>
+        </p:nvCxnSpPr>
+        <p:spPr>
+          <a:xfrm flipH="1">
+            <a:off x="4174958" y="2394284"/>
+            <a:ext cx="950495" cy="1600200"/>
+          </a:xfrm>
+          <a:prstGeom prst="straightConnector1">
+            <a:avLst/>
+          </a:prstGeom>
+          <a:ln>
+            <a:tailEnd type="triangle"/>
+          </a:ln>
+        </p:spPr>
+        <p:style>
+          <a:lnRef idx="1">
+            <a:schemeClr val="accent1"/>
+          </a:lnRef>
+          <a:fillRef idx="0">
+            <a:schemeClr val="accent1"/>
+          </a:fillRef>
+          <a:effectRef idx="0">
+            <a:schemeClr val="accent1"/>
+          </a:effectRef>
+          <a:fontRef idx="minor">
+            <a:schemeClr val="tx1"/>
+          </a:fontRef>
+        </p:style>
+      </p:cxnSp>
+      <p:cxnSp>
+        <p:nvCxnSpPr>
+          <p:cNvPr id="7" name="Straight Arrow Connector 6">
+            <a:extLst>
+              <a:ext uri="{FF2B5EF4-FFF2-40B4-BE49-F238E27FC236}">
+                <a16:creationId xmlns:a16="http://schemas.microsoft.com/office/drawing/2014/main" id="{75FDA2B5-90F2-424A-B169-F3FE50F3C824}"/>
+              </a:ext>
+            </a:extLst>
+          </p:cNvPr>
+          <p:cNvCxnSpPr>
+            <a:cxnSpLocks/>
+          </p:cNvCxnSpPr>
+          <p:nvPr/>
+        </p:nvCxnSpPr>
+        <p:spPr>
+          <a:xfrm>
+            <a:off x="5805237" y="2719137"/>
+            <a:ext cx="0" cy="1925051"/>
+          </a:xfrm>
+          <a:prstGeom prst="straightConnector1">
+            <a:avLst/>
+          </a:prstGeom>
+          <a:ln>
+            <a:tailEnd type="triangle"/>
+          </a:ln>
+        </p:spPr>
+        <p:style>
+          <a:lnRef idx="1">
+            <a:schemeClr val="accent1"/>
+          </a:lnRef>
+          <a:fillRef idx="0">
+            <a:schemeClr val="accent1"/>
+          </a:fillRef>
+          <a:effectRef idx="0">
+            <a:schemeClr val="accent1"/>
+          </a:effectRef>
+          <a:fontRef idx="minor">
+            <a:schemeClr val="tx1"/>
+          </a:fontRef>
+        </p:style>
+      </p:cxnSp>
+      <p:cxnSp>
+        <p:nvCxnSpPr>
+          <p:cNvPr id="9" name="Straight Arrow Connector 8">
+            <a:extLst>
+              <a:ext uri="{FF2B5EF4-FFF2-40B4-BE49-F238E27FC236}">
+                <a16:creationId xmlns:a16="http://schemas.microsoft.com/office/drawing/2014/main" id="{E58C3821-4F44-92A5-236D-E2B69703C047}"/>
+              </a:ext>
+            </a:extLst>
+          </p:cNvPr>
+          <p:cNvCxnSpPr>
+            <a:cxnSpLocks/>
+          </p:cNvCxnSpPr>
+          <p:nvPr/>
+        </p:nvCxnSpPr>
+        <p:spPr>
+          <a:xfrm>
+            <a:off x="6523121" y="2069433"/>
+            <a:ext cx="1562100" cy="1744578"/>
+          </a:xfrm>
+          <a:prstGeom prst="straightConnector1">
+            <a:avLst/>
+          </a:prstGeom>
+          <a:ln>
+            <a:tailEnd type="triangle"/>
+          </a:ln>
+        </p:spPr>
+        <p:style>
+          <a:lnRef idx="1">
+            <a:schemeClr val="accent1"/>
+          </a:lnRef>
+          <a:fillRef idx="0">
+            <a:schemeClr val="accent1"/>
+          </a:fillRef>
+          <a:effectRef idx="0">
+            <a:schemeClr val="accent1"/>
+          </a:effectRef>
+          <a:fontRef idx="minor">
+            <a:schemeClr val="tx1"/>
+          </a:fontRef>
+        </p:style>
+      </p:cxnSp>
+      <p:sp>
+        <p:nvSpPr>
+          <p:cNvPr id="11" name="Rectangle: Rounded Corners 10">
+            <a:extLst>
+              <a:ext uri="{FF2B5EF4-FFF2-40B4-BE49-F238E27FC236}">
+                <a16:creationId xmlns:a16="http://schemas.microsoft.com/office/drawing/2014/main" id="{8D4C4FD1-7B4C-D3C7-D264-0B6FDF311ADF}"/>
+              </a:ext>
+            </a:extLst>
+          </p:cNvPr>
+          <p:cNvSpPr/>
+          <p:nvPr/>
+        </p:nvSpPr>
+        <p:spPr>
+          <a:xfrm>
+            <a:off x="3298113" y="3862137"/>
+            <a:ext cx="1302504" cy="1428615"/>
+          </a:xfrm>
+          <a:prstGeom prst="roundRect">
+            <a:avLst/>
+          </a:prstGeom>
+        </p:spPr>
+        <p:style>
+          <a:lnRef idx="2">
+            <a:schemeClr val="accent1">
+              <a:shade val="50000"/>
+            </a:schemeClr>
+          </a:lnRef>
+          <a:fillRef idx="1">
+            <a:schemeClr val="accent1"/>
+          </a:fillRef>
+          <a:effectRef idx="0">
+            <a:schemeClr val="accent1"/>
+          </a:effectRef>
+          <a:fontRef idx="minor">
+            <a:schemeClr val="lt1"/>
+          </a:fontRef>
+        </p:style>
+        <p:txBody>
+          <a:bodyPr rtlCol="0" anchor="ctr"/>
+          <a:lstStyle/>
+          <a:p>
+            <a:pPr algn="ctr"/>
+            <a:endParaRPr lang="en-US"/>
+          </a:p>
+        </p:txBody>
+      </p:sp>
+      <p:sp>
+        <p:nvSpPr>
+          <p:cNvPr id="12" name="Rectangle: Rounded Corners 11">
+            <a:extLst>
+              <a:ext uri="{FF2B5EF4-FFF2-40B4-BE49-F238E27FC236}">
+                <a16:creationId xmlns:a16="http://schemas.microsoft.com/office/drawing/2014/main" id="{5E8EE4DA-782C-71C6-A187-9418DFFE781C}"/>
+              </a:ext>
+            </a:extLst>
+          </p:cNvPr>
+          <p:cNvSpPr/>
+          <p:nvPr/>
+        </p:nvSpPr>
+        <p:spPr>
+          <a:xfrm>
+            <a:off x="5444748" y="4523875"/>
+            <a:ext cx="1302504" cy="1428615"/>
+          </a:xfrm>
+          <a:prstGeom prst="roundRect">
+            <a:avLst/>
+          </a:prstGeom>
+        </p:spPr>
+        <p:style>
+          <a:lnRef idx="2">
+            <a:schemeClr val="accent1">
+              <a:shade val="50000"/>
+            </a:schemeClr>
+          </a:lnRef>
+          <a:fillRef idx="1">
+            <a:schemeClr val="accent1"/>
+          </a:fillRef>
+          <a:effectRef idx="0">
+            <a:schemeClr val="accent1"/>
+          </a:effectRef>
+          <a:fontRef idx="minor">
+            <a:schemeClr val="lt1"/>
+          </a:fontRef>
+        </p:style>
+        <p:txBody>
+          <a:bodyPr rtlCol="0" anchor="ctr"/>
+          <a:lstStyle/>
+          <a:p>
+            <a:pPr algn="ctr"/>
+            <a:endParaRPr lang="en-US"/>
+          </a:p>
+        </p:txBody>
+      </p:sp>
+      <p:sp>
+        <p:nvSpPr>
+          <p:cNvPr id="13" name="Rectangle: Rounded Corners 12">
+            <a:extLst>
+              <a:ext uri="{FF2B5EF4-FFF2-40B4-BE49-F238E27FC236}">
+                <a16:creationId xmlns:a16="http://schemas.microsoft.com/office/drawing/2014/main" id="{1BAA4A62-B4C2-2634-17E9-DB4521B1EA6B}"/>
+              </a:ext>
+            </a:extLst>
+          </p:cNvPr>
+          <p:cNvSpPr/>
+          <p:nvPr/>
+        </p:nvSpPr>
+        <p:spPr>
+          <a:xfrm>
+            <a:off x="3450513" y="4014537"/>
+            <a:ext cx="1302504" cy="1428615"/>
+          </a:xfrm>
+          <a:prstGeom prst="roundRect">
+            <a:avLst/>
+          </a:prstGeom>
+        </p:spPr>
+        <p:style>
+          <a:lnRef idx="2">
+            <a:schemeClr val="accent1">
+              <a:shade val="50000"/>
+            </a:schemeClr>
+          </a:lnRef>
+          <a:fillRef idx="1">
+            <a:schemeClr val="accent1"/>
+          </a:fillRef>
+          <a:effectRef idx="0">
+            <a:schemeClr val="accent1"/>
+          </a:effectRef>
+          <a:fontRef idx="minor">
+            <a:schemeClr val="lt1"/>
+          </a:fontRef>
+        </p:style>
+        <p:txBody>
+          <a:bodyPr rtlCol="0" anchor="ctr"/>
+          <a:lstStyle/>
+          <a:p>
+            <a:pPr algn="ctr"/>
+            <a:endParaRPr lang="en-US"/>
+          </a:p>
+        </p:txBody>
+      </p:sp>
+      <p:sp>
+        <p:nvSpPr>
+          <p:cNvPr id="14" name="Rectangle: Rounded Corners 13">
+            <a:extLst>
+              <a:ext uri="{FF2B5EF4-FFF2-40B4-BE49-F238E27FC236}">
+                <a16:creationId xmlns:a16="http://schemas.microsoft.com/office/drawing/2014/main" id="{68C90EF4-A3BB-4122-8D3F-5228FF982134}"/>
+              </a:ext>
+            </a:extLst>
+          </p:cNvPr>
+          <p:cNvSpPr/>
+          <p:nvPr/>
+        </p:nvSpPr>
+        <p:spPr>
+          <a:xfrm>
+            <a:off x="7585365" y="3717757"/>
+            <a:ext cx="1302504" cy="1428615"/>
+          </a:xfrm>
+          <a:prstGeom prst="roundRect">
+            <a:avLst/>
+          </a:prstGeom>
+        </p:spPr>
+        <p:style>
+          <a:lnRef idx="2">
+            <a:schemeClr val="accent1">
+              <a:shade val="50000"/>
+            </a:schemeClr>
+          </a:lnRef>
+          <a:fillRef idx="1">
+            <a:schemeClr val="accent1"/>
+          </a:fillRef>
+          <a:effectRef idx="0">
+            <a:schemeClr val="accent1"/>
+          </a:effectRef>
+          <a:fontRef idx="minor">
+            <a:schemeClr val="lt1"/>
+          </a:fontRef>
+        </p:style>
+        <p:txBody>
+          <a:bodyPr rtlCol="0" anchor="ctr"/>
+          <a:lstStyle/>
+          <a:p>
+            <a:pPr algn="ctr"/>
+            <a:endParaRPr lang="en-US"/>
+          </a:p>
+        </p:txBody>
+      </p:sp>
+      <p:sp>
+        <p:nvSpPr>
+          <p:cNvPr id="15" name="TextBox 14">
+            <a:extLst>
+              <a:ext uri="{FF2B5EF4-FFF2-40B4-BE49-F238E27FC236}">
+                <a16:creationId xmlns:a16="http://schemas.microsoft.com/office/drawing/2014/main" id="{5D7EA68C-0659-06FD-A1EE-285CCAFDB6C0}"/>
+              </a:ext>
+            </a:extLst>
+          </p:cNvPr>
+          <p:cNvSpPr txBox="1"/>
+          <p:nvPr/>
+        </p:nvSpPr>
+        <p:spPr>
+          <a:xfrm>
+            <a:off x="9649326" y="4321022"/>
+            <a:ext cx="1732548" cy="646331"/>
+          </a:xfrm>
+          <a:prstGeom prst="rect">
+            <a:avLst/>
+          </a:prstGeom>
+          <a:noFill/>
+        </p:spPr>
+        <p:txBody>
+          <a:bodyPr wrap="square" rtlCol="0">
+            <a:spAutoFit/>
+          </a:bodyPr>
+          <a:lstStyle/>
+          <a:p>
+            <a:r>
+              <a:rPr lang="en-US" dirty="0"/>
+              <a:t>Analysis Ready Datasets</a:t>
+            </a:r>
+          </a:p>
+        </p:txBody>
+      </p:sp>
+      <p:sp>
+        <p:nvSpPr>
+          <p:cNvPr id="16" name="TextBox 15">
+            <a:extLst>
+              <a:ext uri="{FF2B5EF4-FFF2-40B4-BE49-F238E27FC236}">
+                <a16:creationId xmlns:a16="http://schemas.microsoft.com/office/drawing/2014/main" id="{112E39BF-FCB6-0786-1DC6-9214CE4C609D}"/>
+              </a:ext>
+            </a:extLst>
+          </p:cNvPr>
+          <p:cNvSpPr txBox="1"/>
+          <p:nvPr/>
+        </p:nvSpPr>
+        <p:spPr>
+          <a:xfrm>
+            <a:off x="6926178" y="1406738"/>
+            <a:ext cx="4720387" cy="923330"/>
+          </a:xfrm>
+          <a:prstGeom prst="rect">
+            <a:avLst/>
+          </a:prstGeom>
+          <a:noFill/>
+        </p:spPr>
+        <p:txBody>
+          <a:bodyPr wrap="square" rtlCol="0">
+            <a:spAutoFit/>
+          </a:bodyPr>
+          <a:lstStyle/>
+          <a:p>
+            <a:r>
+              <a:rPr lang="en-US" dirty="0"/>
+              <a:t>Raw Data:</a:t>
+            </a:r>
+          </a:p>
+          <a:p>
+            <a:pPr marL="285750" indent="-285750">
+              <a:buFont typeface="Arial" panose="020B0604020202020204" pitchFamily="34" charset="0"/>
+              <a:buChar char="•"/>
+            </a:pPr>
+            <a:r>
+              <a:rPr lang="en-US" dirty="0"/>
+              <a:t>Contains ALL variables</a:t>
+            </a:r>
+          </a:p>
+          <a:p>
+            <a:pPr marL="285750" indent="-285750">
+              <a:buFont typeface="Arial" panose="020B0604020202020204" pitchFamily="34" charset="0"/>
+              <a:buChar char="•"/>
+            </a:pPr>
+            <a:r>
+              <a:rPr lang="en-US" dirty="0"/>
+              <a:t>Variables are not formatted or analysis ready.</a:t>
+            </a:r>
           </a:p>
         </p:txBody>
       </p:sp>
@@ -4694,7 +5990,438 @@
 </p:sld>
 </file>
 
-<file path=ppt/slides/slide6.xml><?xml version="1.0" encoding="utf-8"?>
+<file path=ppt/slides/slide7.xml><?xml version="1.0" encoding="utf-8"?>
+<p:sld xmlns:a="http://schemas.openxmlformats.org/drawingml/2006/main" xmlns:r="http://schemas.openxmlformats.org/officeDocument/2006/relationships" xmlns:p="http://schemas.openxmlformats.org/presentationml/2006/main">
+  <p:cSld>
+    <p:spTree>
+      <p:nvGrpSpPr>
+        <p:cNvPr id="1" name=""/>
+        <p:cNvGrpSpPr/>
+        <p:nvPr/>
+      </p:nvGrpSpPr>
+      <p:grpSpPr>
+        <a:xfrm>
+          <a:off x="0" y="0"/>
+          <a:ext cx="0" cy="0"/>
+          <a:chOff x="0" y="0"/>
+          <a:chExt cx="0" cy="0"/>
+        </a:xfrm>
+      </p:grpSpPr>
+      <p:sp>
+        <p:nvSpPr>
+          <p:cNvPr id="2" name="Title 1">
+            <a:extLst>
+              <a:ext uri="{FF2B5EF4-FFF2-40B4-BE49-F238E27FC236}">
+                <a16:creationId xmlns:a16="http://schemas.microsoft.com/office/drawing/2014/main" id="{CB28B4E0-BD83-A256-76F1-CE0FA9FEDCA1}"/>
+              </a:ext>
+            </a:extLst>
+          </p:cNvPr>
+          <p:cNvSpPr txBox="1">
+            <a:spLocks/>
+          </p:cNvSpPr>
+          <p:nvPr/>
+        </p:nvSpPr>
+        <p:spPr>
+          <a:xfrm>
+            <a:off x="383552" y="354778"/>
+            <a:ext cx="10515600" cy="743238"/>
+          </a:xfrm>
+          <a:prstGeom prst="rect">
+            <a:avLst/>
+          </a:prstGeom>
+        </p:spPr>
+        <p:txBody>
+          <a:bodyPr vert="horz" lIns="91440" tIns="45720" rIns="91440" bIns="45720" rtlCol="0" anchor="ctr">
+            <a:normAutofit/>
+          </a:bodyPr>
+          <a:lstStyle>
+            <a:lvl1pPr algn="l" defTabSz="914400" rtl="0" eaLnBrk="1" latinLnBrk="0" hangingPunct="1">
+              <a:lnSpc>
+                <a:spcPct val="90000"/>
+              </a:lnSpc>
+              <a:spcBef>
+                <a:spcPct val="0"/>
+              </a:spcBef>
+              <a:buNone/>
+              <a:defRPr sz="4400" kern="1200">
+                <a:solidFill>
+                  <a:schemeClr val="tx1"/>
+                </a:solidFill>
+                <a:latin typeface="+mj-lt"/>
+                <a:ea typeface="+mj-ea"/>
+                <a:cs typeface="+mj-cs"/>
+              </a:defRPr>
+            </a:lvl1pPr>
+          </a:lstStyle>
+          <a:p>
+            <a:r>
+              <a:rPr lang="en-US" sz="3200" dirty="0"/>
+              <a:t>BEACH Analysis Workflow: build()</a:t>
+            </a:r>
+          </a:p>
+        </p:txBody>
+      </p:sp>
+      <p:cxnSp>
+        <p:nvCxnSpPr>
+          <p:cNvPr id="4" name="Straight Arrow Connector 3">
+            <a:extLst>
+              <a:ext uri="{FF2B5EF4-FFF2-40B4-BE49-F238E27FC236}">
+                <a16:creationId xmlns:a16="http://schemas.microsoft.com/office/drawing/2014/main" id="{AD82EAB8-3714-2791-3989-835F0B0962E5}"/>
+              </a:ext>
+            </a:extLst>
+          </p:cNvPr>
+          <p:cNvCxnSpPr>
+            <a:cxnSpLocks/>
+          </p:cNvCxnSpPr>
+          <p:nvPr/>
+        </p:nvCxnSpPr>
+        <p:spPr>
+          <a:xfrm flipV="1">
+            <a:off x="1443789" y="2865521"/>
+            <a:ext cx="8253664" cy="238626"/>
+          </a:xfrm>
+          <a:prstGeom prst="straightConnector1">
+            <a:avLst/>
+          </a:prstGeom>
+          <a:ln>
+            <a:tailEnd type="triangle"/>
+          </a:ln>
+        </p:spPr>
+        <p:style>
+          <a:lnRef idx="1">
+            <a:schemeClr val="accent1"/>
+          </a:lnRef>
+          <a:fillRef idx="0">
+            <a:schemeClr val="accent1"/>
+          </a:fillRef>
+          <a:effectRef idx="0">
+            <a:schemeClr val="accent1"/>
+          </a:effectRef>
+          <a:fontRef idx="minor">
+            <a:schemeClr val="tx1"/>
+          </a:fontRef>
+        </p:style>
+      </p:cxnSp>
+      <p:sp>
+        <p:nvSpPr>
+          <p:cNvPr id="5" name="Rectangle: Rounded Corners 4">
+            <a:extLst>
+              <a:ext uri="{FF2B5EF4-FFF2-40B4-BE49-F238E27FC236}">
+                <a16:creationId xmlns:a16="http://schemas.microsoft.com/office/drawing/2014/main" id="{661878BA-D9E9-CF29-745F-C8CECB44773B}"/>
+              </a:ext>
+            </a:extLst>
+          </p:cNvPr>
+          <p:cNvSpPr/>
+          <p:nvPr/>
+        </p:nvSpPr>
+        <p:spPr>
+          <a:xfrm>
+            <a:off x="10094495" y="1708484"/>
+            <a:ext cx="1660358" cy="2009274"/>
+          </a:xfrm>
+          <a:prstGeom prst="roundRect">
+            <a:avLst/>
+          </a:prstGeom>
+        </p:spPr>
+        <p:style>
+          <a:lnRef idx="2">
+            <a:schemeClr val="accent1">
+              <a:shade val="50000"/>
+            </a:schemeClr>
+          </a:lnRef>
+          <a:fillRef idx="1">
+            <a:schemeClr val="accent1"/>
+          </a:fillRef>
+          <a:effectRef idx="0">
+            <a:schemeClr val="accent1"/>
+          </a:effectRef>
+          <a:fontRef idx="minor">
+            <a:schemeClr val="lt1"/>
+          </a:fontRef>
+        </p:style>
+        <p:txBody>
+          <a:bodyPr rtlCol="0" anchor="ctr"/>
+          <a:lstStyle/>
+          <a:p>
+            <a:pPr algn="ctr"/>
+            <a:endParaRPr lang="en-US"/>
+          </a:p>
+        </p:txBody>
+      </p:sp>
+      <p:sp>
+        <p:nvSpPr>
+          <p:cNvPr id="6" name="Rectangle: Rounded Corners 5">
+            <a:extLst>
+              <a:ext uri="{FF2B5EF4-FFF2-40B4-BE49-F238E27FC236}">
+                <a16:creationId xmlns:a16="http://schemas.microsoft.com/office/drawing/2014/main" id="{A5094AB8-CB8E-8910-027C-271360AEADC3}"/>
+              </a:ext>
+            </a:extLst>
+          </p:cNvPr>
+          <p:cNvSpPr/>
+          <p:nvPr/>
+        </p:nvSpPr>
+        <p:spPr>
+          <a:xfrm>
+            <a:off x="588088" y="1860884"/>
+            <a:ext cx="1660358" cy="2009274"/>
+          </a:xfrm>
+          <a:prstGeom prst="roundRect">
+            <a:avLst/>
+          </a:prstGeom>
+        </p:spPr>
+        <p:style>
+          <a:lnRef idx="2">
+            <a:schemeClr val="accent1">
+              <a:shade val="50000"/>
+            </a:schemeClr>
+          </a:lnRef>
+          <a:fillRef idx="1">
+            <a:schemeClr val="accent1"/>
+          </a:fillRef>
+          <a:effectRef idx="0">
+            <a:schemeClr val="accent1"/>
+          </a:effectRef>
+          <a:fontRef idx="minor">
+            <a:schemeClr val="lt1"/>
+          </a:fontRef>
+        </p:style>
+        <p:txBody>
+          <a:bodyPr rtlCol="0" anchor="ctr"/>
+          <a:lstStyle/>
+          <a:p>
+            <a:pPr algn="ctr"/>
+            <a:endParaRPr lang="en-US"/>
+          </a:p>
+        </p:txBody>
+      </p:sp>
+      <p:sp>
+        <p:nvSpPr>
+          <p:cNvPr id="7" name="TextBox 6">
+            <a:extLst>
+              <a:ext uri="{FF2B5EF4-FFF2-40B4-BE49-F238E27FC236}">
+                <a16:creationId xmlns:a16="http://schemas.microsoft.com/office/drawing/2014/main" id="{EC74D7EB-7383-9E45-F225-2289CDBE7BAA}"/>
+              </a:ext>
+            </a:extLst>
+          </p:cNvPr>
+          <p:cNvSpPr txBox="1"/>
+          <p:nvPr/>
+        </p:nvSpPr>
+        <p:spPr>
+          <a:xfrm>
+            <a:off x="10311063" y="726397"/>
+            <a:ext cx="1443790" cy="369332"/>
+          </a:xfrm>
+          <a:prstGeom prst="rect">
+            <a:avLst/>
+          </a:prstGeom>
+          <a:noFill/>
+        </p:spPr>
+        <p:txBody>
+          <a:bodyPr wrap="square" rtlCol="0">
+            <a:spAutoFit/>
+          </a:bodyPr>
+          <a:lstStyle/>
+          <a:p>
+            <a:r>
+              <a:rPr lang="en-US" dirty="0"/>
+              <a:t>Fancy report</a:t>
+            </a:r>
+          </a:p>
+        </p:txBody>
+      </p:sp>
+      <p:sp>
+        <p:nvSpPr>
+          <p:cNvPr id="8" name="TextBox 7">
+            <a:extLst>
+              <a:ext uri="{FF2B5EF4-FFF2-40B4-BE49-F238E27FC236}">
+                <a16:creationId xmlns:a16="http://schemas.microsoft.com/office/drawing/2014/main" id="{FF9DF15A-087E-36BB-AEB5-8C9586D5779E}"/>
+              </a:ext>
+            </a:extLst>
+          </p:cNvPr>
+          <p:cNvSpPr txBox="1"/>
+          <p:nvPr/>
+        </p:nvSpPr>
+        <p:spPr>
+          <a:xfrm>
+            <a:off x="588088" y="4066492"/>
+            <a:ext cx="1443790" cy="646331"/>
+          </a:xfrm>
+          <a:prstGeom prst="rect">
+            <a:avLst/>
+          </a:prstGeom>
+          <a:noFill/>
+        </p:spPr>
+        <p:txBody>
+          <a:bodyPr wrap="square" rtlCol="0">
+            <a:spAutoFit/>
+          </a:bodyPr>
+          <a:lstStyle/>
+          <a:p>
+            <a:r>
+              <a:rPr lang="en-US" dirty="0"/>
+              <a:t>Not Fancy report</a:t>
+            </a:r>
+          </a:p>
+        </p:txBody>
+      </p:sp>
+    </p:spTree>
+    <p:extLst>
+      <p:ext uri="{BB962C8B-B14F-4D97-AF65-F5344CB8AC3E}">
+        <p14:creationId xmlns:p14="http://schemas.microsoft.com/office/powerpoint/2010/main" val="4028735922"/>
+      </p:ext>
+    </p:extLst>
+  </p:cSld>
+  <p:clrMapOvr>
+    <a:masterClrMapping/>
+  </p:clrMapOvr>
+</p:sld>
+</file>
+
+<file path=ppt/slides/slide8.xml><?xml version="1.0" encoding="utf-8"?>
+<p:sld xmlns:a="http://schemas.openxmlformats.org/drawingml/2006/main" xmlns:r="http://schemas.openxmlformats.org/officeDocument/2006/relationships" xmlns:p="http://schemas.openxmlformats.org/presentationml/2006/main">
+  <p:cSld>
+    <p:spTree>
+      <p:nvGrpSpPr>
+        <p:cNvPr id="1" name=""/>
+        <p:cNvGrpSpPr/>
+        <p:nvPr/>
+      </p:nvGrpSpPr>
+      <p:grpSpPr>
+        <a:xfrm>
+          <a:off x="0" y="0"/>
+          <a:ext cx="0" cy="0"/>
+          <a:chOff x="0" y="0"/>
+          <a:chExt cx="0" cy="0"/>
+        </a:xfrm>
+      </p:grpSpPr>
+      <p:pic>
+        <p:nvPicPr>
+          <p:cNvPr id="5" name="Picture 4">
+            <a:extLst>
+              <a:ext uri="{FF2B5EF4-FFF2-40B4-BE49-F238E27FC236}">
+                <a16:creationId xmlns:a16="http://schemas.microsoft.com/office/drawing/2014/main" id="{20965776-D60D-5356-D546-1EF0FFC9AF84}"/>
+              </a:ext>
+            </a:extLst>
+          </p:cNvPr>
+          <p:cNvPicPr>
+            <a:picLocks noChangeAspect="1"/>
+          </p:cNvPicPr>
+          <p:nvPr/>
+        </p:nvPicPr>
+        <p:blipFill rotWithShape="1">
+          <a:blip r:embed="rId2"/>
+          <a:srcRect l="21864" r="48644" b="44870"/>
+          <a:stretch/>
+        </p:blipFill>
+        <p:spPr>
+          <a:xfrm>
+            <a:off x="1487837" y="647117"/>
+            <a:ext cx="8090116" cy="5901807"/>
+          </a:xfrm>
+          <a:prstGeom prst="rect">
+            <a:avLst/>
+          </a:prstGeom>
+        </p:spPr>
+      </p:pic>
+      <p:cxnSp>
+        <p:nvCxnSpPr>
+          <p:cNvPr id="7" name="Straight Arrow Connector 6">
+            <a:extLst>
+              <a:ext uri="{FF2B5EF4-FFF2-40B4-BE49-F238E27FC236}">
+                <a16:creationId xmlns:a16="http://schemas.microsoft.com/office/drawing/2014/main" id="{99BE4D42-BC12-6F4B-82A9-440B0BC689CA}"/>
+              </a:ext>
+            </a:extLst>
+          </p:cNvPr>
+          <p:cNvCxnSpPr>
+            <a:cxnSpLocks/>
+          </p:cNvCxnSpPr>
+          <p:nvPr/>
+        </p:nvCxnSpPr>
+        <p:spPr>
+          <a:xfrm flipH="1">
+            <a:off x="9472728" y="4421299"/>
+            <a:ext cx="1367725" cy="0"/>
+          </a:xfrm>
+          <a:prstGeom prst="straightConnector1">
+            <a:avLst/>
+          </a:prstGeom>
+          <a:ln w="76200">
+            <a:solidFill>
+              <a:srgbClr val="FF0000"/>
+            </a:solidFill>
+            <a:tailEnd type="triangle"/>
+          </a:ln>
+        </p:spPr>
+        <p:style>
+          <a:lnRef idx="1">
+            <a:schemeClr val="accent1"/>
+          </a:lnRef>
+          <a:fillRef idx="0">
+            <a:schemeClr val="accent1"/>
+          </a:fillRef>
+          <a:effectRef idx="0">
+            <a:schemeClr val="accent1"/>
+          </a:effectRef>
+          <a:fontRef idx="minor">
+            <a:schemeClr val="tx1"/>
+          </a:fontRef>
+        </p:style>
+      </p:cxnSp>
+      <p:sp>
+        <p:nvSpPr>
+          <p:cNvPr id="9" name="TextBox 8">
+            <a:extLst>
+              <a:ext uri="{FF2B5EF4-FFF2-40B4-BE49-F238E27FC236}">
+                <a16:creationId xmlns:a16="http://schemas.microsoft.com/office/drawing/2014/main" id="{58EFF7D3-BD58-F0D5-9BAD-0E45164A9D24}"/>
+              </a:ext>
+            </a:extLst>
+          </p:cNvPr>
+          <p:cNvSpPr txBox="1"/>
+          <p:nvPr/>
+        </p:nvSpPr>
+        <p:spPr>
+          <a:xfrm>
+            <a:off x="10156590" y="4515615"/>
+            <a:ext cx="1840832" cy="646331"/>
+          </a:xfrm>
+          <a:prstGeom prst="rect">
+            <a:avLst/>
+          </a:prstGeom>
+          <a:noFill/>
+        </p:spPr>
+        <p:txBody>
+          <a:bodyPr wrap="square" rtlCol="0">
+            <a:spAutoFit/>
+          </a:bodyPr>
+          <a:lstStyle/>
+          <a:p>
+            <a:r>
+              <a:rPr lang="en-US" dirty="0"/>
+              <a:t>Select:</a:t>
+            </a:r>
+          </a:p>
+          <a:p>
+            <a:r>
+              <a:rPr lang="en-US" dirty="0"/>
+              <a:t>BEACH Study</a:t>
+            </a:r>
+          </a:p>
+        </p:txBody>
+      </p:sp>
+    </p:spTree>
+    <p:extLst>
+      <p:ext uri="{BB962C8B-B14F-4D97-AF65-F5344CB8AC3E}">
+        <p14:creationId xmlns:p14="http://schemas.microsoft.com/office/powerpoint/2010/main" val="1583123211"/>
+      </p:ext>
+    </p:extLst>
+  </p:cSld>
+  <p:clrMapOvr>
+    <a:masterClrMapping/>
+  </p:clrMapOvr>
+</p:sld>
+</file>
+
+<file path=ppt/slides/slide9.xml><?xml version="1.0" encoding="utf-8"?>
 <p:sld xmlns:a="http://schemas.openxmlformats.org/drawingml/2006/main" xmlns:r="http://schemas.openxmlformats.org/officeDocument/2006/relationships" xmlns:p="http://schemas.openxmlformats.org/presentationml/2006/main">
   <p:cSld>
     <p:spTree>
@@ -4797,100 +6524,6 @@
     <p:extLst>
       <p:ext uri="{BB962C8B-B14F-4D97-AF65-F5344CB8AC3E}">
         <p14:creationId xmlns:p14="http://schemas.microsoft.com/office/powerpoint/2010/main" val="741575561"/>
-      </p:ext>
-    </p:extLst>
-  </p:cSld>
-  <p:clrMapOvr>
-    <a:masterClrMapping/>
-  </p:clrMapOvr>
-</p:sld>
-</file>
-
-<file path=ppt/slides/slide7.xml><?xml version="1.0" encoding="utf-8"?>
-<p:sld xmlns:a="http://schemas.openxmlformats.org/drawingml/2006/main" xmlns:r="http://schemas.openxmlformats.org/officeDocument/2006/relationships" xmlns:p="http://schemas.openxmlformats.org/presentationml/2006/main">
-  <p:cSld>
-    <p:spTree>
-      <p:nvGrpSpPr>
-        <p:cNvPr id="1" name=""/>
-        <p:cNvGrpSpPr/>
-        <p:nvPr/>
-      </p:nvGrpSpPr>
-      <p:grpSpPr>
-        <a:xfrm>
-          <a:off x="0" y="0"/>
-          <a:ext cx="0" cy="0"/>
-          <a:chOff x="0" y="0"/>
-          <a:chExt cx="0" cy="0"/>
-        </a:xfrm>
-      </p:grpSpPr>
-      <p:sp>
-        <p:nvSpPr>
-          <p:cNvPr id="2" name="Title 1">
-            <a:extLst>
-              <a:ext uri="{FF2B5EF4-FFF2-40B4-BE49-F238E27FC236}">
-                <a16:creationId xmlns:a16="http://schemas.microsoft.com/office/drawing/2014/main" id="{63B6EC4C-6DDF-482E-8EED-85C7D405DE6E}"/>
-              </a:ext>
-            </a:extLst>
-          </p:cNvPr>
-          <p:cNvSpPr>
-            <a:spLocks noGrp="1"/>
-          </p:cNvSpPr>
-          <p:nvPr>
-            <p:ph type="title"/>
-          </p:nvPr>
-        </p:nvSpPr>
-        <p:spPr/>
-        <p:txBody>
-          <a:bodyPr/>
-          <a:lstStyle/>
-          <a:p>
-            <a:r>
-              <a:rPr lang="en-US" dirty="0"/>
-              <a:t>Results</a:t>
-            </a:r>
-          </a:p>
-        </p:txBody>
-      </p:sp>
-      <p:pic>
-        <p:nvPicPr>
-          <p:cNvPr id="5" name="Picture 4">
-            <a:extLst>
-              <a:ext uri="{FF2B5EF4-FFF2-40B4-BE49-F238E27FC236}">
-                <a16:creationId xmlns:a16="http://schemas.microsoft.com/office/drawing/2014/main" id="{A95A1956-0640-684C-8771-A1B2ACAE76A2}"/>
-              </a:ext>
-            </a:extLst>
-          </p:cNvPr>
-          <p:cNvPicPr>
-            <a:picLocks noChangeAspect="1"/>
-          </p:cNvPicPr>
-          <p:nvPr/>
-        </p:nvPicPr>
-        <p:blipFill>
-          <a:blip r:embed="rId2">
-            <a:extLst>
-              <a:ext uri="{28A0092B-C50C-407E-A947-70E740481C1C}">
-                <a14:useLocalDpi xmlns:a14="http://schemas.microsoft.com/office/drawing/2010/main" val="0"/>
-              </a:ext>
-            </a:extLst>
-          </a:blip>
-          <a:stretch>
-            <a:fillRect/>
-          </a:stretch>
-        </p:blipFill>
-        <p:spPr>
-          <a:xfrm>
-            <a:off x="5715728" y="365125"/>
-            <a:ext cx="6007100" cy="5842000"/>
-          </a:xfrm>
-          <a:prstGeom prst="rect">
-            <a:avLst/>
-          </a:prstGeom>
-        </p:spPr>
-      </p:pic>
-    </p:spTree>
-    <p:extLst>
-      <p:ext uri="{BB962C8B-B14F-4D97-AF65-F5344CB8AC3E}">
-        <p14:creationId xmlns:p14="http://schemas.microsoft.com/office/powerpoint/2010/main" val="1040544742"/>
       </p:ext>
     </p:extLst>
   </p:cSld>

</xml_diff>